<commit_message>
final product. added nav modal to home page for sm/xs viewports. final report pdf added to supplemental docs
</commit_message>
<xml_diff>
--- a/Supplemental Docs/Catering Company Website Outline Slides.pptx
+++ b/Supplemental Docs/Catering Company Website Outline Slides.pptx
@@ -11,8 +11,8 @@
     <p:sldId id="259" r:id="rId6"/>
     <p:sldId id="260" r:id="rId7"/>
     <p:sldId id="267" r:id="rId8"/>
-    <p:sldId id="266" r:id="rId9"/>
-    <p:sldId id="263" r:id="rId10"/>
+    <p:sldId id="263" r:id="rId9"/>
+    <p:sldId id="266" r:id="rId10"/>
     <p:sldId id="268" r:id="rId11"/>
     <p:sldId id="269" r:id="rId12"/>
     <p:sldId id="270" r:id="rId13"/>
@@ -9999,10 +9999,10 @@
         </p:nvGrpSpPr>
         <p:grpSpPr>
           <a:xfrm>
-            <a:off x="2259965" y="4646930"/>
-            <a:ext cx="3194050" cy="3474085"/>
-            <a:chOff x="558800" y="520700"/>
-            <a:chExt cx="7912100" cy="4546600"/>
+            <a:off x="2259965" y="4691380"/>
+            <a:ext cx="3228340" cy="2036445"/>
+            <a:chOff x="558800" y="619940"/>
+            <a:chExt cx="7997041" cy="4546600"/>
           </a:xfrm>
         </p:grpSpPr>
         <p:sp>
@@ -10013,7 +10013,7 @@
           </p:nvSpPr>
           <p:spPr>
             <a:xfrm>
-              <a:off x="558800" y="520700"/>
+              <a:off x="643741" y="619940"/>
               <a:ext cx="7912100" cy="4546600"/>
             </a:xfrm>
             <a:prstGeom prst="rect">
@@ -10073,8 +10073,8 @@
           </p:nvSpPr>
           <p:spPr>
             <a:xfrm>
-              <a:off x="558800" y="4152900"/>
-              <a:ext cx="7912100" cy="914400"/>
+              <a:off x="558800" y="2630255"/>
+              <a:ext cx="7912100" cy="2437046"/>
             </a:xfrm>
             <a:prstGeom prst="rect">
               <a:avLst/>
@@ -12744,553 +12744,6 @@
         <p:cNvGrpSpPr/>
         <p:nvPr/>
       </p:nvGrpSpPr>
-      <p:grpSpPr/>
-      <p:grpSp>
-        <p:nvGrpSpPr>
-          <p:cNvPr id="3" name="Hero Unit"/>
-          <p:cNvGrpSpPr/>
-          <p:nvPr/>
-        </p:nvGrpSpPr>
-        <p:grpSpPr>
-          <a:xfrm>
-            <a:off x="1777365" y="3387090"/>
-            <a:ext cx="7802245" cy="1889125"/>
-            <a:chOff x="537786" y="-1927109"/>
-            <a:chExt cx="11148486" cy="2963119"/>
-          </a:xfrm>
-        </p:grpSpPr>
-        <p:sp>
-          <p:nvSpPr>
-            <p:cNvPr id="17" name="Rounded Rectangle 16"/>
-            <p:cNvSpPr/>
-            <p:nvPr/>
-          </p:nvSpPr>
-          <p:spPr>
-            <a:xfrm>
-              <a:off x="537786" y="-1927109"/>
-              <a:ext cx="11148486" cy="2963119"/>
-            </a:xfrm>
-            <a:prstGeom prst="roundRect">
-              <a:avLst>
-                <a:gd name="adj" fmla="val 1452"/>
-              </a:avLst>
-            </a:prstGeom>
-            <a:pattFill prst="ltUpDiag">
-              <a:fgClr>
-                <a:srgbClr val="6493D2"/>
-              </a:fgClr>
-              <a:bgClr>
-                <a:srgbClr val="437CC9"/>
-              </a:bgClr>
-            </a:pattFill>
-            <a:ln>
-              <a:noFill/>
-            </a:ln>
-          </p:spPr>
-          <p:style>
-            <a:lnRef idx="2">
-              <a:schemeClr val="accent1">
-                <a:shade val="50000"/>
-              </a:schemeClr>
-            </a:lnRef>
-            <a:fillRef idx="1">
-              <a:schemeClr val="accent1"/>
-            </a:fillRef>
-            <a:effectRef idx="0">
-              <a:schemeClr val="accent1"/>
-            </a:effectRef>
-            <a:fontRef idx="minor">
-              <a:schemeClr val="lt1"/>
-            </a:fontRef>
-          </p:style>
-          <p:txBody>
-            <a:bodyPr rot="0" spcFirstLastPara="0" vertOverflow="overflow" horzOverflow="overflow" vert="horz" wrap="square" lIns="91440" tIns="45720" rIns="91440" bIns="45720" numCol="1" spcCol="0" rtlCol="0" fromWordArt="0" anchor="ctr" anchorCtr="0" forceAA="0" compatLnSpc="1">
-              <a:noAutofit/>
-            </a:bodyPr>
-            <a:p>
-              <a:pPr algn="ctr"/>
-              <a:endParaRPr lang="en-US" sz="1050" dirty="0" smtClean="0">
-                <a:solidFill>
-                  <a:srgbClr val="FFFFFF"/>
-                </a:solidFill>
-                <a:latin typeface="Arial" panose="020B0604020202020204" pitchFamily="34" charset="0"/>
-                <a:cs typeface="Arial" panose="020B0604020202020204" pitchFamily="34" charset="0"/>
-              </a:endParaRPr>
-            </a:p>
-          </p:txBody>
-        </p:sp>
-        <p:sp>
-          <p:nvSpPr>
-            <p:cNvPr id="15" name="Hero h1"/>
-            <p:cNvSpPr txBox="1"/>
-            <p:nvPr/>
-          </p:nvSpPr>
-          <p:spPr>
-            <a:xfrm>
-              <a:off x="6694088" y="-1589981"/>
-              <a:ext cx="4925949" cy="2315715"/>
-            </a:xfrm>
-            <a:prstGeom prst="rect">
-              <a:avLst/>
-            </a:prstGeom>
-            <a:noFill/>
-            <a:ln w="9525">
-              <a:noFill/>
-            </a:ln>
-          </p:spPr>
-          <p:txBody>
-            <a:bodyPr wrap="square" rtlCol="0">
-              <a:spAutoFit/>
-            </a:bodyPr>
-            <a:p>
-              <a:r>
-                <a:rPr lang="en-US" sz="4500" b="1" dirty="0" smtClean="0">
-                  <a:solidFill>
-                    <a:srgbClr val="FFFFFF"/>
-                  </a:solidFill>
-                  <a:latin typeface="Arial" panose="020B0604020202020204" pitchFamily="34" charset="0"/>
-                  <a:cs typeface="Arial" panose="020B0604020202020204" pitchFamily="34" charset="0"/>
-                </a:rPr>
-                <a:t>Contact info</a:t>
-              </a:r>
-              <a:endParaRPr lang="en-US" sz="4500" b="1" dirty="0" smtClean="0">
-                <a:solidFill>
-                  <a:srgbClr val="FFFFFF"/>
-                </a:solidFill>
-                <a:latin typeface="Arial" panose="020B0604020202020204" pitchFamily="34" charset="0"/>
-                <a:cs typeface="Arial" panose="020B0604020202020204" pitchFamily="34" charset="0"/>
-              </a:endParaRPr>
-            </a:p>
-          </p:txBody>
-        </p:sp>
-        <p:sp>
-          <p:nvSpPr>
-            <p:cNvPr id="16" name="Hero p"/>
-            <p:cNvSpPr/>
-            <p:nvPr/>
-          </p:nvSpPr>
-          <p:spPr>
-            <a:xfrm>
-              <a:off x="715625" y="-1438727"/>
-              <a:ext cx="5022127" cy="1533850"/>
-            </a:xfrm>
-            <a:prstGeom prst="rect">
-              <a:avLst/>
-            </a:prstGeom>
-            <a:ln w="9525">
-              <a:noFill/>
-            </a:ln>
-          </p:spPr>
-          <p:txBody>
-            <a:bodyPr wrap="square">
-              <a:spAutoFit/>
-            </a:bodyPr>
-            <a:p>
-              <a:pPr>
-                <a:lnSpc>
-                  <a:spcPct val="130000"/>
-                </a:lnSpc>
-                <a:spcAft>
-                  <a:spcPts val="600"/>
-                </a:spcAft>
-              </a:pPr>
-              <a:r>
-                <a:rPr lang="en-US" sz="1350" noProof="1">
-                  <a:solidFill>
-                    <a:srgbClr val="FFFFFF"/>
-                  </a:solidFill>
-                  <a:latin typeface="Arial" panose="020B0604020202020204" pitchFamily="34" charset="0"/>
-                  <a:cs typeface="Arial" panose="020B0604020202020204" pitchFamily="34" charset="0"/>
-                </a:rPr>
-                <a:t>Name, Address, Telephone, email, hours of operation</a:t>
-              </a:r>
-              <a:endParaRPr lang="en-US" sz="1350" noProof="1">
-                <a:solidFill>
-                  <a:srgbClr val="FFFFFF"/>
-                </a:solidFill>
-                <a:latin typeface="Arial" panose="020B0604020202020204" pitchFamily="34" charset="0"/>
-                <a:cs typeface="Arial" panose="020B0604020202020204" pitchFamily="34" charset="0"/>
-              </a:endParaRPr>
-            </a:p>
-            <a:p>
-              <a:pPr>
-                <a:lnSpc>
-                  <a:spcPct val="130000"/>
-                </a:lnSpc>
-                <a:spcAft>
-                  <a:spcPts val="600"/>
-                </a:spcAft>
-              </a:pPr>
-              <a:endParaRPr lang="en-US" sz="1350" noProof="1">
-                <a:solidFill>
-                  <a:srgbClr val="FFFFFF"/>
-                </a:solidFill>
-                <a:latin typeface="Arial" panose="020B0604020202020204" pitchFamily="34" charset="0"/>
-                <a:cs typeface="Arial" panose="020B0604020202020204" pitchFamily="34" charset="0"/>
-              </a:endParaRPr>
-            </a:p>
-          </p:txBody>
-        </p:sp>
-      </p:grpSp>
-      <p:grpSp>
-        <p:nvGrpSpPr>
-          <p:cNvPr id="2" name="Hero Unit"/>
-          <p:cNvGrpSpPr/>
-          <p:nvPr/>
-        </p:nvGrpSpPr>
-        <p:grpSpPr>
-          <a:xfrm>
-            <a:off x="1731010" y="792480"/>
-            <a:ext cx="7802245" cy="2594610"/>
-            <a:chOff x="519639" y="578734"/>
-            <a:chExt cx="11148486" cy="2963119"/>
-          </a:xfrm>
-        </p:grpSpPr>
-        <p:sp>
-          <p:nvSpPr>
-            <p:cNvPr id="4" name="Rounded Rectangle 3"/>
-            <p:cNvSpPr/>
-            <p:nvPr/>
-          </p:nvSpPr>
-          <p:spPr>
-            <a:xfrm>
-              <a:off x="519639" y="578734"/>
-              <a:ext cx="11148486" cy="2963119"/>
-            </a:xfrm>
-            <a:prstGeom prst="roundRect">
-              <a:avLst>
-                <a:gd name="adj" fmla="val 1452"/>
-              </a:avLst>
-            </a:prstGeom>
-            <a:pattFill prst="ltUpDiag">
-              <a:fgClr>
-                <a:srgbClr val="6493D2"/>
-              </a:fgClr>
-              <a:bgClr>
-                <a:srgbClr val="437CC9"/>
-              </a:bgClr>
-            </a:pattFill>
-            <a:ln>
-              <a:noFill/>
-            </a:ln>
-          </p:spPr>
-          <p:style>
-            <a:lnRef idx="2">
-              <a:schemeClr val="accent1">
-                <a:shade val="50000"/>
-              </a:schemeClr>
-            </a:lnRef>
-            <a:fillRef idx="1">
-              <a:schemeClr val="accent1"/>
-            </a:fillRef>
-            <a:effectRef idx="0">
-              <a:schemeClr val="accent1"/>
-            </a:effectRef>
-            <a:fontRef idx="minor">
-              <a:schemeClr val="lt1"/>
-            </a:fontRef>
-          </p:style>
-          <p:txBody>
-            <a:bodyPr rot="0" spcFirstLastPara="0" vertOverflow="overflow" horzOverflow="overflow" vert="horz" wrap="square" lIns="91440" tIns="45720" rIns="91440" bIns="45720" numCol="1" spcCol="0" rtlCol="0" fromWordArt="0" anchor="ctr" anchorCtr="0" forceAA="0" compatLnSpc="1">
-              <a:noAutofit/>
-            </a:bodyPr>
-            <a:lstStyle/>
-            <a:p>
-              <a:pPr algn="ctr"/>
-              <a:endParaRPr lang="en-US" sz="1050" dirty="0" smtClean="0">
-                <a:solidFill>
-                  <a:srgbClr val="FFFFFF"/>
-                </a:solidFill>
-                <a:latin typeface="Arial" panose="020B0604020202020204" pitchFamily="34" charset="0"/>
-                <a:cs typeface="Arial" panose="020B0604020202020204" pitchFamily="34" charset="0"/>
-              </a:endParaRPr>
-            </a:p>
-          </p:txBody>
-        </p:sp>
-        <p:sp>
-          <p:nvSpPr>
-            <p:cNvPr id="5" name="Hero h1"/>
-            <p:cNvSpPr txBox="1"/>
-            <p:nvPr/>
-          </p:nvSpPr>
-          <p:spPr>
-            <a:xfrm>
-              <a:off x="763714" y="1550486"/>
-              <a:ext cx="5381433" cy="807134"/>
-            </a:xfrm>
-            <a:prstGeom prst="rect">
-              <a:avLst/>
-            </a:prstGeom>
-            <a:noFill/>
-            <a:ln w="9525">
-              <a:noFill/>
-            </a:ln>
-          </p:spPr>
-          <p:txBody>
-            <a:bodyPr wrap="square" rtlCol="0">
-              <a:spAutoFit/>
-            </a:bodyPr>
-            <a:lstStyle/>
-            <a:p>
-              <a:r>
-                <a:rPr lang="en-US" sz="4000" b="1" dirty="0" smtClean="0">
-                  <a:solidFill>
-                    <a:srgbClr val="FFFFFF"/>
-                  </a:solidFill>
-                  <a:latin typeface="Arial" panose="020B0604020202020204" pitchFamily="34" charset="0"/>
-                  <a:cs typeface="Arial" panose="020B0604020202020204" pitchFamily="34" charset="0"/>
-                </a:rPr>
-                <a:t>Reservations</a:t>
-              </a:r>
-              <a:endParaRPr lang="en-US" sz="4000" b="1" dirty="0" smtClean="0">
-                <a:solidFill>
-                  <a:srgbClr val="FFFFFF"/>
-                </a:solidFill>
-                <a:latin typeface="Arial" panose="020B0604020202020204" pitchFamily="34" charset="0"/>
-                <a:cs typeface="Arial" panose="020B0604020202020204" pitchFamily="34" charset="0"/>
-              </a:endParaRPr>
-            </a:p>
-          </p:txBody>
-        </p:sp>
-        <p:sp>
-          <p:nvSpPr>
-            <p:cNvPr id="6" name="Hero p"/>
-            <p:cNvSpPr/>
-            <p:nvPr/>
-          </p:nvSpPr>
-          <p:spPr>
-            <a:xfrm>
-              <a:off x="6102501" y="1667966"/>
-              <a:ext cx="4960428" cy="412632"/>
-            </a:xfrm>
-            <a:prstGeom prst="rect">
-              <a:avLst/>
-            </a:prstGeom>
-            <a:ln w="9525">
-              <a:noFill/>
-            </a:ln>
-          </p:spPr>
-          <p:txBody>
-            <a:bodyPr wrap="square">
-              <a:spAutoFit/>
-            </a:bodyPr>
-            <a:lstStyle/>
-            <a:p>
-              <a:pPr>
-                <a:lnSpc>
-                  <a:spcPct val="130000"/>
-                </a:lnSpc>
-                <a:spcAft>
-                  <a:spcPts val="600"/>
-                </a:spcAft>
-              </a:pPr>
-              <a:r>
-                <a:rPr lang="en-US" sz="1350" noProof="1">
-                  <a:solidFill>
-                    <a:srgbClr val="FFFFFF"/>
-                  </a:solidFill>
-                  <a:latin typeface="Arial" panose="020B0604020202020204" pitchFamily="34" charset="0"/>
-                  <a:cs typeface="Arial" panose="020B0604020202020204" pitchFamily="34" charset="0"/>
-                </a:rPr>
-                <a:t>Information on how and when to reserve.</a:t>
-              </a:r>
-              <a:endParaRPr lang="en-US" sz="1350" noProof="1">
-                <a:solidFill>
-                  <a:srgbClr val="FFFFFF"/>
-                </a:solidFill>
-                <a:latin typeface="Arial" panose="020B0604020202020204" pitchFamily="34" charset="0"/>
-                <a:cs typeface="Arial" panose="020B0604020202020204" pitchFamily="34" charset="0"/>
-              </a:endParaRPr>
-            </a:p>
-          </p:txBody>
-        </p:sp>
-      </p:grpSp>
-      <p:sp>
-        <p:nvSpPr>
-          <p:cNvPr id="54" name="Button (Large)"/>
-          <p:cNvSpPr/>
-          <p:nvPr/>
-        </p:nvSpPr>
-        <p:spPr>
-          <a:xfrm>
-            <a:off x="6268085" y="2005433"/>
-            <a:ext cx="2305050" cy="427149"/>
-          </a:xfrm>
-          <a:prstGeom prst="roundRect">
-            <a:avLst/>
-          </a:prstGeom>
-          <a:pattFill prst="ltUpDiag">
-            <a:fgClr>
-              <a:srgbClr val="6493D2"/>
-            </a:fgClr>
-            <a:bgClr>
-              <a:srgbClr val="97B7E1"/>
-            </a:bgClr>
-          </a:pattFill>
-          <a:ln w="9525">
-            <a:solidFill>
-              <a:srgbClr val="FFFFFF"/>
-            </a:solidFill>
-          </a:ln>
-        </p:spPr>
-        <p:style>
-          <a:lnRef idx="2">
-            <a:schemeClr val="accent1">
-              <a:shade val="50000"/>
-            </a:schemeClr>
-          </a:lnRef>
-          <a:fillRef idx="1">
-            <a:schemeClr val="accent1"/>
-          </a:fillRef>
-          <a:effectRef idx="0">
-            <a:schemeClr val="accent1"/>
-          </a:effectRef>
-          <a:fontRef idx="minor">
-            <a:schemeClr val="lt1"/>
-          </a:fontRef>
-        </p:style>
-        <p:txBody>
-          <a:bodyPr rot="0" spcFirstLastPara="0" vertOverflow="overflow" horzOverflow="overflow" vert="horz" wrap="square" lIns="173736" tIns="91440" rIns="173736" bIns="91440" numCol="1" spcCol="0" rtlCol="0" fromWordArt="0" anchor="ctr" anchorCtr="0" forceAA="0" compatLnSpc="1">
-            <a:spAutoFit/>
-          </a:bodyPr>
-          <a:p>
-            <a:pPr algn="ctr"/>
-            <a:r>
-              <a:rPr lang="en-US" sz="1315" dirty="0" smtClean="0">
-                <a:solidFill>
-                  <a:srgbClr val="FFFFFF"/>
-                </a:solidFill>
-                <a:latin typeface="Arial" panose="020B0604020202020204" pitchFamily="34" charset="0"/>
-                <a:cs typeface="Arial" panose="020B0604020202020204" pitchFamily="34" charset="0"/>
-              </a:rPr>
-              <a:t>Link to Reserve page</a:t>
-            </a:r>
-            <a:endParaRPr lang="en-US" sz="1315" dirty="0" smtClean="0">
-              <a:solidFill>
-                <a:srgbClr val="FFFFFF"/>
-              </a:solidFill>
-              <a:latin typeface="Arial" panose="020B0604020202020204" pitchFamily="34" charset="0"/>
-              <a:cs typeface="Arial" panose="020B0604020202020204" pitchFamily="34" charset="0"/>
-            </a:endParaRPr>
-          </a:p>
-        </p:txBody>
-      </p:sp>
-      <p:sp>
-        <p:nvSpPr>
-          <p:cNvPr id="10" name="Button (Large)"/>
-          <p:cNvSpPr/>
-          <p:nvPr/>
-        </p:nvSpPr>
-        <p:spPr>
-          <a:xfrm>
-            <a:off x="2918460" y="3796769"/>
-            <a:ext cx="2305050" cy="427147"/>
-          </a:xfrm>
-          <a:prstGeom prst="roundRect">
-            <a:avLst/>
-          </a:prstGeom>
-          <a:pattFill prst="ltUpDiag">
-            <a:fgClr>
-              <a:srgbClr val="6493D2"/>
-            </a:fgClr>
-            <a:bgClr>
-              <a:srgbClr val="97B7E1"/>
-            </a:bgClr>
-          </a:pattFill>
-          <a:ln w="9525">
-            <a:solidFill>
-              <a:srgbClr val="FFFFFF"/>
-            </a:solidFill>
-          </a:ln>
-        </p:spPr>
-        <p:style>
-          <a:lnRef idx="2">
-            <a:schemeClr val="accent1">
-              <a:shade val="50000"/>
-            </a:schemeClr>
-          </a:lnRef>
-          <a:fillRef idx="1">
-            <a:schemeClr val="accent1"/>
-          </a:fillRef>
-          <a:effectRef idx="0">
-            <a:schemeClr val="accent1"/>
-          </a:effectRef>
-          <a:fontRef idx="minor">
-            <a:schemeClr val="lt1"/>
-          </a:fontRef>
-        </p:style>
-        <p:txBody>
-          <a:bodyPr rot="0" spcFirstLastPara="0" vertOverflow="overflow" horzOverflow="overflow" vert="horz" wrap="square" lIns="173736" tIns="91440" rIns="173736" bIns="91440" numCol="1" spcCol="0" rtlCol="0" fromWordArt="0" anchor="ctr" anchorCtr="0" forceAA="0" compatLnSpc="1">
-            <a:spAutoFit/>
-          </a:bodyPr>
-          <a:p>
-            <a:pPr algn="ctr"/>
-            <a:r>
-              <a:rPr lang="en-US" sz="1315" dirty="0" smtClean="0">
-                <a:solidFill>
-                  <a:srgbClr val="FFFFFF"/>
-                </a:solidFill>
-                <a:latin typeface="Arial" panose="020B0604020202020204" pitchFamily="34" charset="0"/>
-                <a:cs typeface="Arial" panose="020B0604020202020204" pitchFamily="34" charset="0"/>
-              </a:rPr>
-              <a:t>Link to Contact</a:t>
-            </a:r>
-            <a:endParaRPr lang="en-US" sz="1315" dirty="0" smtClean="0">
-              <a:solidFill>
-                <a:srgbClr val="FFFFFF"/>
-              </a:solidFill>
-              <a:latin typeface="Arial" panose="020B0604020202020204" pitchFamily="34" charset="0"/>
-              <a:cs typeface="Arial" panose="020B0604020202020204" pitchFamily="34" charset="0"/>
-            </a:endParaRPr>
-          </a:p>
-        </p:txBody>
-      </p:sp>
-      <p:sp>
-        <p:nvSpPr>
-          <p:cNvPr id="7" name="Text Box 6"/>
-          <p:cNvSpPr txBox="1"/>
-          <p:nvPr/>
-        </p:nvSpPr>
-        <p:spPr>
-          <a:xfrm>
-            <a:off x="4918710" y="424180"/>
-            <a:ext cx="2052320" cy="368300"/>
-          </a:xfrm>
-          <a:prstGeom prst="rect">
-            <a:avLst/>
-          </a:prstGeom>
-          <a:noFill/>
-        </p:spPr>
-        <p:txBody>
-          <a:bodyPr wrap="square" rtlCol="0">
-            <a:spAutoFit/>
-          </a:bodyPr>
-          <a:p>
-            <a:r>
-              <a:rPr lang="en-US" u="sng"/>
-              <a:t>Accordion</a:t>
-            </a:r>
-            <a:endParaRPr lang="en-US" u="sng"/>
-          </a:p>
-        </p:txBody>
-      </p:sp>
-    </p:spTree>
-  </p:cSld>
-  <p:clrMapOvr>
-    <a:masterClrMapping/>
-  </p:clrMapOvr>
-</p:sld>
-</file>
-
-<file path=ppt/slides/slide8.xml><?xml version="1.0" encoding="utf-8"?>
-<p:sld xmlns:a="http://schemas.openxmlformats.org/drawingml/2006/main" xmlns:r="http://schemas.openxmlformats.org/officeDocument/2006/relationships" xmlns:p="http://schemas.openxmlformats.org/presentationml/2006/main">
-  <p:cSld>
-    <p:spTree>
-      <p:nvGrpSpPr>
-        <p:cNvPr id="1" name=""/>
-        <p:cNvGrpSpPr/>
-        <p:nvPr/>
-      </p:nvGrpSpPr>
       <p:grpSpPr>
         <a:xfrm>
           <a:off x="0" y="0"/>
@@ -14587,6 +14040,553 @@
 </p:sld>
 </file>
 
+<file path=ppt/slides/slide8.xml><?xml version="1.0" encoding="utf-8"?>
+<p:sld xmlns:a="http://schemas.openxmlformats.org/drawingml/2006/main" xmlns:r="http://schemas.openxmlformats.org/officeDocument/2006/relationships" xmlns:p="http://schemas.openxmlformats.org/presentationml/2006/main">
+  <p:cSld>
+    <p:spTree>
+      <p:nvGrpSpPr>
+        <p:cNvPr id="1" name=""/>
+        <p:cNvGrpSpPr/>
+        <p:nvPr/>
+      </p:nvGrpSpPr>
+      <p:grpSpPr/>
+      <p:grpSp>
+        <p:nvGrpSpPr>
+          <p:cNvPr id="3" name="Hero Unit"/>
+          <p:cNvGrpSpPr/>
+          <p:nvPr/>
+        </p:nvGrpSpPr>
+        <p:grpSpPr>
+          <a:xfrm>
+            <a:off x="1777365" y="3387090"/>
+            <a:ext cx="7802245" cy="1889125"/>
+            <a:chOff x="537786" y="-1927109"/>
+            <a:chExt cx="11148486" cy="2963119"/>
+          </a:xfrm>
+        </p:grpSpPr>
+        <p:sp>
+          <p:nvSpPr>
+            <p:cNvPr id="17" name="Rounded Rectangle 16"/>
+            <p:cNvSpPr/>
+            <p:nvPr/>
+          </p:nvSpPr>
+          <p:spPr>
+            <a:xfrm>
+              <a:off x="537786" y="-1927109"/>
+              <a:ext cx="11148486" cy="2963119"/>
+            </a:xfrm>
+            <a:prstGeom prst="roundRect">
+              <a:avLst>
+                <a:gd name="adj" fmla="val 1452"/>
+              </a:avLst>
+            </a:prstGeom>
+            <a:pattFill prst="ltUpDiag">
+              <a:fgClr>
+                <a:srgbClr val="6493D2"/>
+              </a:fgClr>
+              <a:bgClr>
+                <a:srgbClr val="437CC9"/>
+              </a:bgClr>
+            </a:pattFill>
+            <a:ln>
+              <a:noFill/>
+            </a:ln>
+          </p:spPr>
+          <p:style>
+            <a:lnRef idx="2">
+              <a:schemeClr val="accent1">
+                <a:shade val="50000"/>
+              </a:schemeClr>
+            </a:lnRef>
+            <a:fillRef idx="1">
+              <a:schemeClr val="accent1"/>
+            </a:fillRef>
+            <a:effectRef idx="0">
+              <a:schemeClr val="accent1"/>
+            </a:effectRef>
+            <a:fontRef idx="minor">
+              <a:schemeClr val="lt1"/>
+            </a:fontRef>
+          </p:style>
+          <p:txBody>
+            <a:bodyPr rot="0" spcFirstLastPara="0" vertOverflow="overflow" horzOverflow="overflow" vert="horz" wrap="square" lIns="91440" tIns="45720" rIns="91440" bIns="45720" numCol="1" spcCol="0" rtlCol="0" fromWordArt="0" anchor="ctr" anchorCtr="0" forceAA="0" compatLnSpc="1">
+              <a:noAutofit/>
+            </a:bodyPr>
+            <a:p>
+              <a:pPr algn="ctr"/>
+              <a:endParaRPr lang="en-US" sz="1050" dirty="0" smtClean="0">
+                <a:solidFill>
+                  <a:srgbClr val="FFFFFF"/>
+                </a:solidFill>
+                <a:latin typeface="Arial" panose="020B0604020202020204" pitchFamily="34" charset="0"/>
+                <a:cs typeface="Arial" panose="020B0604020202020204" pitchFamily="34" charset="0"/>
+              </a:endParaRPr>
+            </a:p>
+          </p:txBody>
+        </p:sp>
+        <p:sp>
+          <p:nvSpPr>
+            <p:cNvPr id="15" name="Hero h1"/>
+            <p:cNvSpPr txBox="1"/>
+            <p:nvPr/>
+          </p:nvSpPr>
+          <p:spPr>
+            <a:xfrm>
+              <a:off x="6694088" y="-1589981"/>
+              <a:ext cx="4925949" cy="2315715"/>
+            </a:xfrm>
+            <a:prstGeom prst="rect">
+              <a:avLst/>
+            </a:prstGeom>
+            <a:noFill/>
+            <a:ln w="9525">
+              <a:noFill/>
+            </a:ln>
+          </p:spPr>
+          <p:txBody>
+            <a:bodyPr wrap="square" rtlCol="0">
+              <a:spAutoFit/>
+            </a:bodyPr>
+            <a:p>
+              <a:r>
+                <a:rPr lang="en-US" sz="4500" b="1" dirty="0" smtClean="0">
+                  <a:solidFill>
+                    <a:srgbClr val="FFFFFF"/>
+                  </a:solidFill>
+                  <a:latin typeface="Arial" panose="020B0604020202020204" pitchFamily="34" charset="0"/>
+                  <a:cs typeface="Arial" panose="020B0604020202020204" pitchFamily="34" charset="0"/>
+                </a:rPr>
+                <a:t>Contact info</a:t>
+              </a:r>
+              <a:endParaRPr lang="en-US" sz="4500" b="1" dirty="0" smtClean="0">
+                <a:solidFill>
+                  <a:srgbClr val="FFFFFF"/>
+                </a:solidFill>
+                <a:latin typeface="Arial" panose="020B0604020202020204" pitchFamily="34" charset="0"/>
+                <a:cs typeface="Arial" panose="020B0604020202020204" pitchFamily="34" charset="0"/>
+              </a:endParaRPr>
+            </a:p>
+          </p:txBody>
+        </p:sp>
+        <p:sp>
+          <p:nvSpPr>
+            <p:cNvPr id="16" name="Hero p"/>
+            <p:cNvSpPr/>
+            <p:nvPr/>
+          </p:nvSpPr>
+          <p:spPr>
+            <a:xfrm>
+              <a:off x="715625" y="-1438727"/>
+              <a:ext cx="5022127" cy="1533850"/>
+            </a:xfrm>
+            <a:prstGeom prst="rect">
+              <a:avLst/>
+            </a:prstGeom>
+            <a:ln w="9525">
+              <a:noFill/>
+            </a:ln>
+          </p:spPr>
+          <p:txBody>
+            <a:bodyPr wrap="square">
+              <a:spAutoFit/>
+            </a:bodyPr>
+            <a:p>
+              <a:pPr>
+                <a:lnSpc>
+                  <a:spcPct val="130000"/>
+                </a:lnSpc>
+                <a:spcAft>
+                  <a:spcPts val="600"/>
+                </a:spcAft>
+              </a:pPr>
+              <a:r>
+                <a:rPr lang="en-US" sz="1350" noProof="1">
+                  <a:solidFill>
+                    <a:srgbClr val="FFFFFF"/>
+                  </a:solidFill>
+                  <a:latin typeface="Arial" panose="020B0604020202020204" pitchFamily="34" charset="0"/>
+                  <a:cs typeface="Arial" panose="020B0604020202020204" pitchFamily="34" charset="0"/>
+                </a:rPr>
+                <a:t>Name, Address, Telephone, email, hours of operation</a:t>
+              </a:r>
+              <a:endParaRPr lang="en-US" sz="1350" noProof="1">
+                <a:solidFill>
+                  <a:srgbClr val="FFFFFF"/>
+                </a:solidFill>
+                <a:latin typeface="Arial" panose="020B0604020202020204" pitchFamily="34" charset="0"/>
+                <a:cs typeface="Arial" panose="020B0604020202020204" pitchFamily="34" charset="0"/>
+              </a:endParaRPr>
+            </a:p>
+            <a:p>
+              <a:pPr>
+                <a:lnSpc>
+                  <a:spcPct val="130000"/>
+                </a:lnSpc>
+                <a:spcAft>
+                  <a:spcPts val="600"/>
+                </a:spcAft>
+              </a:pPr>
+              <a:endParaRPr lang="en-US" sz="1350" noProof="1">
+                <a:solidFill>
+                  <a:srgbClr val="FFFFFF"/>
+                </a:solidFill>
+                <a:latin typeface="Arial" panose="020B0604020202020204" pitchFamily="34" charset="0"/>
+                <a:cs typeface="Arial" panose="020B0604020202020204" pitchFamily="34" charset="0"/>
+              </a:endParaRPr>
+            </a:p>
+          </p:txBody>
+        </p:sp>
+      </p:grpSp>
+      <p:grpSp>
+        <p:nvGrpSpPr>
+          <p:cNvPr id="2" name="Hero Unit"/>
+          <p:cNvGrpSpPr/>
+          <p:nvPr/>
+        </p:nvGrpSpPr>
+        <p:grpSpPr>
+          <a:xfrm>
+            <a:off x="1731010" y="792480"/>
+            <a:ext cx="7802245" cy="2594610"/>
+            <a:chOff x="519639" y="578734"/>
+            <a:chExt cx="11148486" cy="2963119"/>
+          </a:xfrm>
+        </p:grpSpPr>
+        <p:sp>
+          <p:nvSpPr>
+            <p:cNvPr id="4" name="Rounded Rectangle 3"/>
+            <p:cNvSpPr/>
+            <p:nvPr/>
+          </p:nvSpPr>
+          <p:spPr>
+            <a:xfrm>
+              <a:off x="519639" y="578734"/>
+              <a:ext cx="11148486" cy="2963119"/>
+            </a:xfrm>
+            <a:prstGeom prst="roundRect">
+              <a:avLst>
+                <a:gd name="adj" fmla="val 1452"/>
+              </a:avLst>
+            </a:prstGeom>
+            <a:pattFill prst="ltUpDiag">
+              <a:fgClr>
+                <a:srgbClr val="6493D2"/>
+              </a:fgClr>
+              <a:bgClr>
+                <a:srgbClr val="437CC9"/>
+              </a:bgClr>
+            </a:pattFill>
+            <a:ln>
+              <a:noFill/>
+            </a:ln>
+          </p:spPr>
+          <p:style>
+            <a:lnRef idx="2">
+              <a:schemeClr val="accent1">
+                <a:shade val="50000"/>
+              </a:schemeClr>
+            </a:lnRef>
+            <a:fillRef idx="1">
+              <a:schemeClr val="accent1"/>
+            </a:fillRef>
+            <a:effectRef idx="0">
+              <a:schemeClr val="accent1"/>
+            </a:effectRef>
+            <a:fontRef idx="minor">
+              <a:schemeClr val="lt1"/>
+            </a:fontRef>
+          </p:style>
+          <p:txBody>
+            <a:bodyPr rot="0" spcFirstLastPara="0" vertOverflow="overflow" horzOverflow="overflow" vert="horz" wrap="square" lIns="91440" tIns="45720" rIns="91440" bIns="45720" numCol="1" spcCol="0" rtlCol="0" fromWordArt="0" anchor="ctr" anchorCtr="0" forceAA="0" compatLnSpc="1">
+              <a:noAutofit/>
+            </a:bodyPr>
+            <a:lstStyle/>
+            <a:p>
+              <a:pPr algn="ctr"/>
+              <a:endParaRPr lang="en-US" sz="1050" dirty="0" smtClean="0">
+                <a:solidFill>
+                  <a:srgbClr val="FFFFFF"/>
+                </a:solidFill>
+                <a:latin typeface="Arial" panose="020B0604020202020204" pitchFamily="34" charset="0"/>
+                <a:cs typeface="Arial" panose="020B0604020202020204" pitchFamily="34" charset="0"/>
+              </a:endParaRPr>
+            </a:p>
+          </p:txBody>
+        </p:sp>
+        <p:sp>
+          <p:nvSpPr>
+            <p:cNvPr id="5" name="Hero h1"/>
+            <p:cNvSpPr txBox="1"/>
+            <p:nvPr/>
+          </p:nvSpPr>
+          <p:spPr>
+            <a:xfrm>
+              <a:off x="763714" y="1550486"/>
+              <a:ext cx="5381433" cy="807134"/>
+            </a:xfrm>
+            <a:prstGeom prst="rect">
+              <a:avLst/>
+            </a:prstGeom>
+            <a:noFill/>
+            <a:ln w="9525">
+              <a:noFill/>
+            </a:ln>
+          </p:spPr>
+          <p:txBody>
+            <a:bodyPr wrap="square" rtlCol="0">
+              <a:spAutoFit/>
+            </a:bodyPr>
+            <a:lstStyle/>
+            <a:p>
+              <a:r>
+                <a:rPr lang="en-US" sz="4000" b="1" dirty="0" smtClean="0">
+                  <a:solidFill>
+                    <a:srgbClr val="FFFFFF"/>
+                  </a:solidFill>
+                  <a:latin typeface="Arial" panose="020B0604020202020204" pitchFamily="34" charset="0"/>
+                  <a:cs typeface="Arial" panose="020B0604020202020204" pitchFamily="34" charset="0"/>
+                </a:rPr>
+                <a:t>Reservations</a:t>
+              </a:r>
+              <a:endParaRPr lang="en-US" sz="4000" b="1" dirty="0" smtClean="0">
+                <a:solidFill>
+                  <a:srgbClr val="FFFFFF"/>
+                </a:solidFill>
+                <a:latin typeface="Arial" panose="020B0604020202020204" pitchFamily="34" charset="0"/>
+                <a:cs typeface="Arial" panose="020B0604020202020204" pitchFamily="34" charset="0"/>
+              </a:endParaRPr>
+            </a:p>
+          </p:txBody>
+        </p:sp>
+        <p:sp>
+          <p:nvSpPr>
+            <p:cNvPr id="6" name="Hero p"/>
+            <p:cNvSpPr/>
+            <p:nvPr/>
+          </p:nvSpPr>
+          <p:spPr>
+            <a:xfrm>
+              <a:off x="6102501" y="1667966"/>
+              <a:ext cx="4960428" cy="412632"/>
+            </a:xfrm>
+            <a:prstGeom prst="rect">
+              <a:avLst/>
+            </a:prstGeom>
+            <a:ln w="9525">
+              <a:noFill/>
+            </a:ln>
+          </p:spPr>
+          <p:txBody>
+            <a:bodyPr wrap="square">
+              <a:spAutoFit/>
+            </a:bodyPr>
+            <a:lstStyle/>
+            <a:p>
+              <a:pPr>
+                <a:lnSpc>
+                  <a:spcPct val="130000"/>
+                </a:lnSpc>
+                <a:spcAft>
+                  <a:spcPts val="600"/>
+                </a:spcAft>
+              </a:pPr>
+              <a:r>
+                <a:rPr lang="en-US" sz="1350" noProof="1">
+                  <a:solidFill>
+                    <a:srgbClr val="FFFFFF"/>
+                  </a:solidFill>
+                  <a:latin typeface="Arial" panose="020B0604020202020204" pitchFamily="34" charset="0"/>
+                  <a:cs typeface="Arial" panose="020B0604020202020204" pitchFamily="34" charset="0"/>
+                </a:rPr>
+                <a:t>Information on how and when to reserve.</a:t>
+              </a:r>
+              <a:endParaRPr lang="en-US" sz="1350" noProof="1">
+                <a:solidFill>
+                  <a:srgbClr val="FFFFFF"/>
+                </a:solidFill>
+                <a:latin typeface="Arial" panose="020B0604020202020204" pitchFamily="34" charset="0"/>
+                <a:cs typeface="Arial" panose="020B0604020202020204" pitchFamily="34" charset="0"/>
+              </a:endParaRPr>
+            </a:p>
+          </p:txBody>
+        </p:sp>
+      </p:grpSp>
+      <p:sp>
+        <p:nvSpPr>
+          <p:cNvPr id="54" name="Button (Large)"/>
+          <p:cNvSpPr/>
+          <p:nvPr/>
+        </p:nvSpPr>
+        <p:spPr>
+          <a:xfrm>
+            <a:off x="6268085" y="2005433"/>
+            <a:ext cx="2305050" cy="427149"/>
+          </a:xfrm>
+          <a:prstGeom prst="roundRect">
+            <a:avLst/>
+          </a:prstGeom>
+          <a:pattFill prst="ltUpDiag">
+            <a:fgClr>
+              <a:srgbClr val="6493D2"/>
+            </a:fgClr>
+            <a:bgClr>
+              <a:srgbClr val="97B7E1"/>
+            </a:bgClr>
+          </a:pattFill>
+          <a:ln w="9525">
+            <a:solidFill>
+              <a:srgbClr val="FFFFFF"/>
+            </a:solidFill>
+          </a:ln>
+        </p:spPr>
+        <p:style>
+          <a:lnRef idx="2">
+            <a:schemeClr val="accent1">
+              <a:shade val="50000"/>
+            </a:schemeClr>
+          </a:lnRef>
+          <a:fillRef idx="1">
+            <a:schemeClr val="accent1"/>
+          </a:fillRef>
+          <a:effectRef idx="0">
+            <a:schemeClr val="accent1"/>
+          </a:effectRef>
+          <a:fontRef idx="minor">
+            <a:schemeClr val="lt1"/>
+          </a:fontRef>
+        </p:style>
+        <p:txBody>
+          <a:bodyPr rot="0" spcFirstLastPara="0" vertOverflow="overflow" horzOverflow="overflow" vert="horz" wrap="square" lIns="173736" tIns="91440" rIns="173736" bIns="91440" numCol="1" spcCol="0" rtlCol="0" fromWordArt="0" anchor="ctr" anchorCtr="0" forceAA="0" compatLnSpc="1">
+            <a:spAutoFit/>
+          </a:bodyPr>
+          <a:p>
+            <a:pPr algn="ctr"/>
+            <a:r>
+              <a:rPr lang="en-US" sz="1315" dirty="0" smtClean="0">
+                <a:solidFill>
+                  <a:srgbClr val="FFFFFF"/>
+                </a:solidFill>
+                <a:latin typeface="Arial" panose="020B0604020202020204" pitchFamily="34" charset="0"/>
+                <a:cs typeface="Arial" panose="020B0604020202020204" pitchFamily="34" charset="0"/>
+              </a:rPr>
+              <a:t>Link to Reserve page</a:t>
+            </a:r>
+            <a:endParaRPr lang="en-US" sz="1315" dirty="0" smtClean="0">
+              <a:solidFill>
+                <a:srgbClr val="FFFFFF"/>
+              </a:solidFill>
+              <a:latin typeface="Arial" panose="020B0604020202020204" pitchFamily="34" charset="0"/>
+              <a:cs typeface="Arial" panose="020B0604020202020204" pitchFamily="34" charset="0"/>
+            </a:endParaRPr>
+          </a:p>
+        </p:txBody>
+      </p:sp>
+      <p:sp>
+        <p:nvSpPr>
+          <p:cNvPr id="10" name="Button (Large)"/>
+          <p:cNvSpPr/>
+          <p:nvPr/>
+        </p:nvSpPr>
+        <p:spPr>
+          <a:xfrm>
+            <a:off x="2918460" y="3796769"/>
+            <a:ext cx="2305050" cy="427147"/>
+          </a:xfrm>
+          <a:prstGeom prst="roundRect">
+            <a:avLst/>
+          </a:prstGeom>
+          <a:pattFill prst="ltUpDiag">
+            <a:fgClr>
+              <a:srgbClr val="6493D2"/>
+            </a:fgClr>
+            <a:bgClr>
+              <a:srgbClr val="97B7E1"/>
+            </a:bgClr>
+          </a:pattFill>
+          <a:ln w="9525">
+            <a:solidFill>
+              <a:srgbClr val="FFFFFF"/>
+            </a:solidFill>
+          </a:ln>
+        </p:spPr>
+        <p:style>
+          <a:lnRef idx="2">
+            <a:schemeClr val="accent1">
+              <a:shade val="50000"/>
+            </a:schemeClr>
+          </a:lnRef>
+          <a:fillRef idx="1">
+            <a:schemeClr val="accent1"/>
+          </a:fillRef>
+          <a:effectRef idx="0">
+            <a:schemeClr val="accent1"/>
+          </a:effectRef>
+          <a:fontRef idx="minor">
+            <a:schemeClr val="lt1"/>
+          </a:fontRef>
+        </p:style>
+        <p:txBody>
+          <a:bodyPr rot="0" spcFirstLastPara="0" vertOverflow="overflow" horzOverflow="overflow" vert="horz" wrap="square" lIns="173736" tIns="91440" rIns="173736" bIns="91440" numCol="1" spcCol="0" rtlCol="0" fromWordArt="0" anchor="ctr" anchorCtr="0" forceAA="0" compatLnSpc="1">
+            <a:spAutoFit/>
+          </a:bodyPr>
+          <a:p>
+            <a:pPr algn="ctr"/>
+            <a:r>
+              <a:rPr lang="en-US" sz="1315" dirty="0" smtClean="0">
+                <a:solidFill>
+                  <a:srgbClr val="FFFFFF"/>
+                </a:solidFill>
+                <a:latin typeface="Arial" panose="020B0604020202020204" pitchFamily="34" charset="0"/>
+                <a:cs typeface="Arial" panose="020B0604020202020204" pitchFamily="34" charset="0"/>
+              </a:rPr>
+              <a:t>Link to Contact</a:t>
+            </a:r>
+            <a:endParaRPr lang="en-US" sz="1315" dirty="0" smtClean="0">
+              <a:solidFill>
+                <a:srgbClr val="FFFFFF"/>
+              </a:solidFill>
+              <a:latin typeface="Arial" panose="020B0604020202020204" pitchFamily="34" charset="0"/>
+              <a:cs typeface="Arial" panose="020B0604020202020204" pitchFamily="34" charset="0"/>
+            </a:endParaRPr>
+          </a:p>
+        </p:txBody>
+      </p:sp>
+      <p:sp>
+        <p:nvSpPr>
+          <p:cNvPr id="7" name="Text Box 6"/>
+          <p:cNvSpPr txBox="1"/>
+          <p:nvPr/>
+        </p:nvSpPr>
+        <p:spPr>
+          <a:xfrm>
+            <a:off x="4918710" y="424180"/>
+            <a:ext cx="2052320" cy="368300"/>
+          </a:xfrm>
+          <a:prstGeom prst="rect">
+            <a:avLst/>
+          </a:prstGeom>
+          <a:noFill/>
+        </p:spPr>
+        <p:txBody>
+          <a:bodyPr wrap="square" rtlCol="0">
+            <a:spAutoFit/>
+          </a:bodyPr>
+          <a:p>
+            <a:r>
+              <a:rPr lang="en-US" u="sng"/>
+              <a:t>Accordion</a:t>
+            </a:r>
+            <a:endParaRPr lang="en-US" u="sng"/>
+          </a:p>
+        </p:txBody>
+      </p:sp>
+    </p:spTree>
+  </p:cSld>
+  <p:clrMapOvr>
+    <a:masterClrMapping/>
+  </p:clrMapOvr>
+</p:sld>
+</file>
+
 <file path=ppt/slides/slide9.xml><?xml version="1.0" encoding="utf-8"?>
 <p:sld xmlns:a="http://schemas.openxmlformats.org/drawingml/2006/main" xmlns:r="http://schemas.openxmlformats.org/officeDocument/2006/relationships" xmlns:p="http://schemas.openxmlformats.org/presentationml/2006/main">
   <p:cSld>

</xml_diff>